<commit_message>
modified presentation and added last comment
</commit_message>
<xml_diff>
--- a/ML Project (ECG analysis).pptx
+++ b/ML Project (ECG analysis).pptx
@@ -8,10 +8,12 @@
     <p:sldId id="256" r:id="rId2"/>
     <p:sldId id="257" r:id="rId3"/>
     <p:sldId id="263" r:id="rId4"/>
-    <p:sldId id="259" r:id="rId5"/>
-    <p:sldId id="260" r:id="rId6"/>
-    <p:sldId id="261" r:id="rId7"/>
-    <p:sldId id="262" r:id="rId8"/>
+    <p:sldId id="264" r:id="rId5"/>
+    <p:sldId id="259" r:id="rId6"/>
+    <p:sldId id="260" r:id="rId7"/>
+    <p:sldId id="261" r:id="rId8"/>
+    <p:sldId id="262" r:id="rId9"/>
+    <p:sldId id="265" r:id="rId10"/>
   </p:sldIdLst>
   <p:sldSz cx="12192000" cy="6858000"/>
   <p:notesSz cx="6858000" cy="9144000"/>
@@ -213,7 +215,7 @@
           <a:effectLst/>
           <a:extLst>
             <a:ext uri="{91240B29-F687-4f45-9708-019B960494DF}">
-              <a14:hiddenLine xmlns="" xmlns:a14="http://schemas.microsoft.com/office/drawing/2010/main" w="9525">
+              <a14:hiddenLine xmlns:a14="http://schemas.microsoft.com/office/drawing/2010/main" xmlns="" w="9525">
                 <a:solidFill>
                   <a:srgbClr val="000000"/>
                 </a:solidFill>
@@ -406,7 +408,7 @@
             <a:fld id="{08B9EBBA-996F-894A-B54A-D6246ED52CEA}" type="datetimeFigureOut">
               <a:rPr lang="en-US" dirty="0"/>
               <a:pPr/>
-              <a:t>11/30/2018</a:t>
+              <a:t>12/2/2018</a:t>
             </a:fld>
             <a:endParaRPr lang="en-US" dirty="0"/>
           </a:p>
@@ -721,7 +723,7 @@
             <a:fld id="{18C79C5D-2A6F-F04D-97DA-BEF2467B64E4}" type="datetimeFigureOut">
               <a:rPr lang="en-US" dirty="0"/>
               <a:pPr/>
-              <a:t>11/30/2018</a:t>
+              <a:t>12/2/2018</a:t>
             </a:fld>
             <a:endParaRPr lang="en-US" dirty="0"/>
           </a:p>
@@ -1206,7 +1208,7 @@
             <a:fld id="{8DFA1846-DA80-1C48-A609-854EA85C59AD}" type="datetimeFigureOut">
               <a:rPr lang="en-US" dirty="0"/>
               <a:pPr/>
-              <a:t>11/30/2018</a:t>
+              <a:t>12/2/2018</a:t>
             </a:fld>
             <a:endParaRPr lang="en-US" dirty="0"/>
           </a:p>
@@ -1572,7 +1574,7 @@
             <a:fld id="{FBF54567-0DE4-3F47-BF90-CB84690072F9}" type="datetimeFigureOut">
               <a:rPr lang="en-US" dirty="0"/>
               <a:pPr/>
-              <a:t>11/30/2018</a:t>
+              <a:t>12/2/2018</a:t>
             </a:fld>
             <a:endParaRPr lang="en-US" dirty="0"/>
           </a:p>
@@ -1723,7 +1725,7 @@
           <a:ln/>
           <a:extLst>
             <a:ext uri="{91240B29-F687-4f45-9708-019B960494DF}">
-              <a14:hiddenLine xmlns="" xmlns:a14="http://schemas.microsoft.com/office/drawing/2010/main" w="9525">
+              <a14:hiddenLine xmlns:a14="http://schemas.microsoft.com/office/drawing/2010/main" xmlns="" w="9525">
                 <a:solidFill>
                   <a:srgbClr val="000000"/>
                 </a:solidFill>
@@ -1842,7 +1844,7 @@
             <a:fld id="{C6C52C72-DE31-F449-A4ED-4C594FD91407}" type="datetimeFigureOut">
               <a:rPr lang="en-US" dirty="0"/>
               <a:pPr/>
-              <a:t>11/30/2018</a:t>
+              <a:t>12/2/2018</a:t>
             </a:fld>
             <a:endParaRPr lang="en-US" dirty="0"/>
           </a:p>
@@ -1995,7 +1997,7 @@
           <a:ln/>
           <a:extLst>
             <a:ext uri="{91240B29-F687-4f45-9708-019B960494DF}">
-              <a14:hiddenLine xmlns="" xmlns:a14="http://schemas.microsoft.com/office/drawing/2010/main" w="9525">
+              <a14:hiddenLine xmlns:a14="http://schemas.microsoft.com/office/drawing/2010/main" xmlns="" w="9525">
                 <a:solidFill>
                   <a:srgbClr val="000000"/>
                 </a:solidFill>
@@ -2124,7 +2126,7 @@
             <a:fld id="{ED62726E-379B-B349-9EED-81ED093FA806}" type="datetimeFigureOut">
               <a:rPr lang="en-US" dirty="0"/>
               <a:pPr/>
-              <a:t>11/30/2018</a:t>
+              <a:t>12/2/2018</a:t>
             </a:fld>
             <a:endParaRPr lang="en-US" dirty="0"/>
           </a:p>
@@ -2275,7 +2277,7 @@
           <a:ln/>
           <a:extLst>
             <a:ext uri="{91240B29-F687-4f45-9708-019B960494DF}">
-              <a14:hiddenLine xmlns="" xmlns:a14="http://schemas.microsoft.com/office/drawing/2010/main" w="9525">
+              <a14:hiddenLine xmlns:a14="http://schemas.microsoft.com/office/drawing/2010/main" xmlns="" w="9525">
                 <a:solidFill>
                   <a:srgbClr val="000000"/>
                 </a:solidFill>
@@ -2404,7 +2406,7 @@
             <a:fld id="{9B3A1323-8D79-1946-B0D7-40001CF92E9D}" type="datetimeFigureOut">
               <a:rPr lang="en-US" dirty="0"/>
               <a:pPr/>
-              <a:t>11/30/2018</a:t>
+              <a:t>12/2/2018</a:t>
             </a:fld>
             <a:endParaRPr lang="en-US" dirty="0"/>
           </a:p>
@@ -2744,7 +2746,7 @@
             <a:fld id="{8DFA1846-DA80-1C48-A609-854EA85C59AD}" type="datetimeFigureOut">
               <a:rPr lang="en-US" dirty="0"/>
               <a:pPr/>
-              <a:t>11/30/2018</a:t>
+              <a:t>12/2/2018</a:t>
             </a:fld>
             <a:endParaRPr lang="en-US" dirty="0"/>
           </a:p>
@@ -2895,7 +2897,7 @@
           <a:ln/>
           <a:extLst>
             <a:ext uri="{91240B29-F687-4f45-9708-019B960494DF}">
-              <a14:hiddenLine xmlns="" xmlns:a14="http://schemas.microsoft.com/office/drawing/2010/main" w="9525">
+              <a14:hiddenLine xmlns:a14="http://schemas.microsoft.com/office/drawing/2010/main" xmlns="" w="9525">
                 <a:solidFill>
                   <a:srgbClr val="000000"/>
                 </a:solidFill>
@@ -3080,7 +3082,7 @@
             <a:fld id="{57302355-E14B-8545-A8F8-0FE83CC9D524}" type="datetimeFigureOut">
               <a:rPr lang="en-US" dirty="0"/>
               <a:pPr/>
-              <a:t>11/30/2018</a:t>
+              <a:t>12/2/2018</a:t>
             </a:fld>
             <a:endParaRPr lang="en-US" dirty="0"/>
           </a:p>
@@ -3231,7 +3233,7 @@
           <a:ln/>
           <a:extLst>
             <a:ext uri="{91240B29-F687-4f45-9708-019B960494DF}">
-              <a14:hiddenLine xmlns="" xmlns:a14="http://schemas.microsoft.com/office/drawing/2010/main" w="9525">
+              <a14:hiddenLine xmlns:a14="http://schemas.microsoft.com/office/drawing/2010/main" xmlns="" w="9525">
                 <a:solidFill>
                   <a:srgbClr val="000000"/>
                 </a:solidFill>
@@ -3554,7 +3556,7 @@
             <a:fld id="{02640F58-564D-2B4F-AE67-E407BA4FCF45}" type="datetimeFigureOut">
               <a:rPr lang="en-US" dirty="0"/>
               <a:pPr/>
-              <a:t>11/30/2018</a:t>
+              <a:t>12/2/2018</a:t>
             </a:fld>
             <a:endParaRPr lang="en-US" dirty="0"/>
           </a:p>
@@ -3705,7 +3707,7 @@
           <a:ln/>
           <a:extLst>
             <a:ext uri="{91240B29-F687-4f45-9708-019B960494DF}">
-              <a14:hiddenLine xmlns="" xmlns:a14="http://schemas.microsoft.com/office/drawing/2010/main" w="9525">
+              <a14:hiddenLine xmlns:a14="http://schemas.microsoft.com/office/drawing/2010/main" xmlns="" w="9525">
                 <a:solidFill>
                   <a:srgbClr val="000000"/>
                 </a:solidFill>
@@ -3772,7 +3774,7 @@
             <a:fld id="{F13A34C8-038E-2045-AF43-DF7DBB8E0E9E}" type="datetimeFigureOut">
               <a:rPr lang="en-US" dirty="0"/>
               <a:pPr/>
-              <a:t>11/30/2018</a:t>
+              <a:t>12/2/2018</a:t>
             </a:fld>
             <a:endParaRPr lang="en-US" dirty="0"/>
           </a:p>
@@ -3864,7 +3866,7 @@
             <a:fld id="{8818C68F-D26B-8F47-958C-23B49CF8A634}" type="datetimeFigureOut">
               <a:rPr lang="en-US" dirty="0"/>
               <a:pPr/>
-              <a:t>11/30/2018</a:t>
+              <a:t>12/2/2018</a:t>
             </a:fld>
             <a:endParaRPr lang="en-US" dirty="0"/>
           </a:p>
@@ -4128,7 +4130,7 @@
           <a:ln/>
           <a:extLst>
             <a:ext uri="{91240B29-F687-4f45-9708-019B960494DF}">
-              <a14:hiddenLine xmlns="" xmlns:a14="http://schemas.microsoft.com/office/drawing/2010/main" w="9525">
+              <a14:hiddenLine xmlns:a14="http://schemas.microsoft.com/office/drawing/2010/main" xmlns="" w="9525">
                 <a:solidFill>
                   <a:srgbClr val="000000"/>
                 </a:solidFill>
@@ -4328,7 +4330,7 @@
             <a:fld id="{D0DF5E60-9974-AC48-9591-99C2BB44B7CF}" type="datetimeFigureOut">
               <a:rPr lang="en-US" dirty="0"/>
               <a:pPr/>
-              <a:t>11/30/2018</a:t>
+              <a:t>12/2/2018</a:t>
             </a:fld>
             <a:endParaRPr lang="en-US" dirty="0"/>
           </a:p>
@@ -4638,7 +4640,7 @@
             <a:fld id="{18C79C5D-2A6F-F04D-97DA-BEF2467B64E4}" type="datetimeFigureOut">
               <a:rPr lang="en-US" dirty="0"/>
               <a:pPr/>
-              <a:t>11/30/2018</a:t>
+              <a:t>12/2/2018</a:t>
             </a:fld>
             <a:endParaRPr lang="en-US" dirty="0"/>
           </a:p>
@@ -4905,7 +4907,7 @@
             <a:fld id="{09B482E8-6E0E-1B4F-B1FD-C69DB9E858D9}" type="datetimeFigureOut">
               <a:rPr lang="en-US" dirty="0"/>
               <a:pPr/>
-              <a:t>11/30/2018</a:t>
+              <a:t>12/2/2018</a:t>
             </a:fld>
             <a:endParaRPr lang="en-US" dirty="0"/>
           </a:p>
@@ -6068,6 +6070,231 @@
           <a:chExt cx="0" cy="0"/>
         </a:xfrm>
       </p:grpSpPr>
+      <p:sp>
+        <p:nvSpPr>
+          <p:cNvPr id="10" name="Freeform 6">
+            <a:extLst>
+              <a:ext uri="{FF2B5EF4-FFF2-40B4-BE49-F238E27FC236}">
+                <a16:creationId xmlns:a16="http://schemas.microsoft.com/office/drawing/2014/main" id="{BFDA6284-4E06-4F93-9624-A49FE810F1C8}"/>
+              </a:ext>
+              <a:ext uri="{C183D7F6-B498-43B3-948B-1728B52AA6E4}">
+                <adec:decorative xmlns:adec="http://schemas.microsoft.com/office/drawing/2017/decorative" val="1"/>
+              </a:ext>
+            </a:extLst>
+          </p:cNvPr>
+          <p:cNvSpPr>
+            <a:spLocks noGrp="1" noRot="1" noChangeAspect="1" noMove="1" noResize="1" noEditPoints="1" noAdjustHandles="1" noChangeArrowheads="1" noChangeShapeType="1" noTextEdit="1"/>
+          </p:cNvSpPr>
+          <p:nvPr>
+            <p:extLst>
+              <p:ext uri="{386F3935-93C4-4BCD-93E2-E3B085C9AB24}">
+                <p16:designElem xmlns:p16="http://schemas.microsoft.com/office/powerpoint/2015/main" val="1"/>
+              </p:ext>
+            </p:extLst>
+          </p:nvPr>
+        </p:nvSpPr>
+        <p:spPr bwMode="auto">
+          <a:xfrm>
+            <a:off x="0" y="-3175"/>
+            <a:ext cx="12192000" cy="5203825"/>
+          </a:xfrm>
+          <a:custGeom>
+            <a:avLst/>
+            <a:gdLst/>
+            <a:ahLst/>
+            <a:cxnLst/>
+            <a:rect l="0" t="0" r="r" b="b"/>
+            <a:pathLst>
+              <a:path w="5760" h="3278">
+                <a:moveTo>
+                  <a:pt x="5760" y="0"/>
+                </a:moveTo>
+                <a:lnTo>
+                  <a:pt x="0" y="0"/>
+                </a:lnTo>
+                <a:lnTo>
+                  <a:pt x="0" y="3090"/>
+                </a:lnTo>
+                <a:lnTo>
+                  <a:pt x="943" y="3090"/>
+                </a:lnTo>
+                <a:lnTo>
+                  <a:pt x="1123" y="3270"/>
+                </a:lnTo>
+                <a:lnTo>
+                  <a:pt x="1123" y="3270"/>
+                </a:lnTo>
+                <a:lnTo>
+                  <a:pt x="1127" y="3272"/>
+                </a:lnTo>
+                <a:lnTo>
+                  <a:pt x="1133" y="3275"/>
+                </a:lnTo>
+                <a:lnTo>
+                  <a:pt x="1139" y="3278"/>
+                </a:lnTo>
+                <a:lnTo>
+                  <a:pt x="1144" y="3278"/>
+                </a:lnTo>
+                <a:lnTo>
+                  <a:pt x="1150" y="3278"/>
+                </a:lnTo>
+                <a:lnTo>
+                  <a:pt x="1155" y="3275"/>
+                </a:lnTo>
+                <a:lnTo>
+                  <a:pt x="1161" y="3272"/>
+                </a:lnTo>
+                <a:lnTo>
+                  <a:pt x="1165" y="3270"/>
+                </a:lnTo>
+                <a:lnTo>
+                  <a:pt x="1345" y="3090"/>
+                </a:lnTo>
+                <a:lnTo>
+                  <a:pt x="5760" y="3090"/>
+                </a:lnTo>
+                <a:lnTo>
+                  <a:pt x="5760" y="0"/>
+                </a:lnTo>
+                <a:close/>
+              </a:path>
+            </a:pathLst>
+          </a:custGeom>
+          <a:ln/>
+          <a:effectLst/>
+          <a:extLst>
+            <a:ext uri="{91240B29-F687-4f45-9708-019B960494DF}">
+              <a14:hiddenLine xmlns="" xmlns:a16="http://schemas.microsoft.com/office/drawing/2014/main" xmlns:p14="http://schemas.microsoft.com/office/powerpoint/2010/main" xmlns:a14="http://schemas.microsoft.com/office/drawing/2010/main" w="9525">
+                <a:solidFill>
+                  <a:srgbClr val="000000"/>
+                </a:solidFill>
+                <a:round/>
+                <a:headEnd/>
+                <a:tailEnd/>
+              </a14:hiddenLine>
+            </a:ext>
+          </a:extLst>
+        </p:spPr>
+        <p:style>
+          <a:lnRef idx="1">
+            <a:schemeClr val="accent1"/>
+          </a:lnRef>
+          <a:fillRef idx="3">
+            <a:schemeClr val="accent1"/>
+          </a:fillRef>
+          <a:effectRef idx="2">
+            <a:schemeClr val="accent1"/>
+          </a:effectRef>
+          <a:fontRef idx="minor">
+            <a:schemeClr val="lt1"/>
+          </a:fontRef>
+        </p:style>
+      </p:sp>
+      <p:sp>
+        <p:nvSpPr>
+          <p:cNvPr id="2" name="Заголовок 1">
+            <a:extLst>
+              <a:ext uri="{FF2B5EF4-FFF2-40B4-BE49-F238E27FC236}">
+                <a16:creationId xmlns:a16="http://schemas.microsoft.com/office/drawing/2014/main" id="{BF4BB5D4-A9F2-43D7-914B-99002533F2C4}"/>
+              </a:ext>
+            </a:extLst>
+          </p:cNvPr>
+          <p:cNvSpPr>
+            <a:spLocks noGrp="1"/>
+          </p:cNvSpPr>
+          <p:nvPr>
+            <p:ph type="title"/>
+          </p:nvPr>
+        </p:nvSpPr>
+        <p:spPr>
+          <a:xfrm>
+            <a:off x="810002" y="639097"/>
+            <a:ext cx="4961534" cy="3781101"/>
+          </a:xfrm>
+        </p:spPr>
+        <p:txBody>
+          <a:bodyPr vert="horz" lIns="91440" tIns="45720" rIns="91440" bIns="45720" rtlCol="0" anchor="b">
+            <a:normAutofit/>
+          </a:bodyPr>
+          <a:lstStyle/>
+          <a:p>
+            <a:r>
+              <a:rPr lang="en-US" sz="5400" dirty="0"/>
+              <a:t>Data Preparation</a:t>
+            </a:r>
+          </a:p>
+        </p:txBody>
+      </p:sp>
+      <p:pic>
+        <p:nvPicPr>
+          <p:cNvPr id="5" name="Объект 4" descr="Изображение выглядит как снимок экрана, текст&#10;&#10;Описание создано автоматически">
+            <a:extLst>
+              <a:ext uri="{FF2B5EF4-FFF2-40B4-BE49-F238E27FC236}">
+                <a16:creationId xmlns:a16="http://schemas.microsoft.com/office/drawing/2014/main" id="{CFD9B3A0-5AA7-4CD8-97AA-C77141C63099}"/>
+              </a:ext>
+            </a:extLst>
+          </p:cNvPr>
+          <p:cNvPicPr>
+            <a:picLocks noGrp="1" noChangeAspect="1"/>
+          </p:cNvPicPr>
+          <p:nvPr>
+            <p:ph idx="1"/>
+          </p:nvPr>
+        </p:nvPicPr>
+        <p:blipFill rotWithShape="1">
+          <a:blip r:embed="rId2"/>
+          <a:srcRect t="1202" r="3" b="3"/>
+          <a:stretch/>
+        </p:blipFill>
+        <p:spPr>
+          <a:xfrm>
+            <a:off x="6100916" y="10"/>
+            <a:ext cx="6091084" cy="6857990"/>
+          </a:xfrm>
+          <a:prstGeom prst="rect">
+            <a:avLst/>
+          </a:prstGeom>
+        </p:spPr>
+      </p:pic>
+    </p:spTree>
+    <p:extLst>
+      <p:ext uri="{BB962C8B-B14F-4D97-AF65-F5344CB8AC3E}">
+        <p14:creationId xmlns:p14="http://schemas.microsoft.com/office/powerpoint/2010/main" val="2134034556"/>
+      </p:ext>
+    </p:extLst>
+  </p:cSld>
+  <p:clrMapOvr>
+    <a:masterClrMapping/>
+  </p:clrMapOvr>
+</p:sld>
+</file>
+
+<file path=ppt/slides/slide5.xml><?xml version="1.0" encoding="utf-8"?>
+<p:sld xmlns:a="http://schemas.openxmlformats.org/drawingml/2006/main" xmlns:r="http://schemas.openxmlformats.org/officeDocument/2006/relationships" xmlns:p="http://schemas.openxmlformats.org/presentationml/2006/main">
+  <p:cSld>
+    <p:bg>
+      <p:bgPr>
+        <a:solidFill>
+          <a:schemeClr val="bg2"/>
+        </a:solidFill>
+        <a:effectLst/>
+      </p:bgPr>
+    </p:bg>
+    <p:spTree>
+      <p:nvGrpSpPr>
+        <p:cNvPr id="1" name=""/>
+        <p:cNvGrpSpPr/>
+        <p:nvPr/>
+      </p:nvGrpSpPr>
+      <p:grpSpPr>
+        <a:xfrm>
+          <a:off x="0" y="0"/>
+          <a:ext cx="0" cy="0"/>
+          <a:chOff x="0" y="0"/>
+          <a:chExt cx="0" cy="0"/>
+        </a:xfrm>
+      </p:grpSpPr>
       <p:sp useBgFill="1">
         <p:nvSpPr>
           <p:cNvPr id="19" name="Rectangle 18">
@@ -6439,7 +6666,7 @@
 </p:sld>
 </file>
 
-<file path=ppt/slides/slide5.xml><?xml version="1.0" encoding="utf-8"?>
+<file path=ppt/slides/slide6.xml><?xml version="1.0" encoding="utf-8"?>
 <p:sld xmlns:a="http://schemas.openxmlformats.org/drawingml/2006/main" xmlns:r="http://schemas.openxmlformats.org/officeDocument/2006/relationships" xmlns:p="http://schemas.openxmlformats.org/presentationml/2006/main">
   <p:cSld>
     <p:spTree>
@@ -6525,9 +6752,39 @@
         </p:blipFill>
         <p:spPr>
           <a:xfrm>
-            <a:off x="629942" y="2432169"/>
+            <a:off x="629942" y="2180242"/>
             <a:ext cx="5427500" cy="2708998"/>
           </a:xfrm>
+        </p:spPr>
+      </p:pic>
+      <p:pic>
+        <p:nvPicPr>
+          <p:cNvPr id="4" name="Рисунок 3" descr="Изображение выглядит как снимок экрана&#10;&#10;Описание создано автоматически">
+            <a:extLst>
+              <a:ext uri="{FF2B5EF4-FFF2-40B4-BE49-F238E27FC236}">
+                <a16:creationId xmlns:a16="http://schemas.microsoft.com/office/drawing/2014/main" id="{5F94F8FF-4427-45A7-9E33-468755650818}"/>
+              </a:ext>
+            </a:extLst>
+          </p:cNvPr>
+          <p:cNvPicPr>
+            <a:picLocks noChangeAspect="1"/>
+          </p:cNvPicPr>
+          <p:nvPr/>
+        </p:nvPicPr>
+        <p:blipFill>
+          <a:blip r:embed="rId3"/>
+          <a:stretch>
+            <a:fillRect/>
+          </a:stretch>
+        </p:blipFill>
+        <p:spPr>
+          <a:xfrm>
+            <a:off x="629942" y="5038529"/>
+            <a:ext cx="9247619" cy="1600000"/>
+          </a:xfrm>
+          <a:prstGeom prst="rect">
+            <a:avLst/>
+          </a:prstGeom>
         </p:spPr>
       </p:pic>
     </p:spTree>
@@ -6543,7 +6800,7 @@
 </p:sld>
 </file>
 
-<file path=ppt/slides/slide6.xml><?xml version="1.0" encoding="utf-8"?>
+<file path=ppt/slides/slide7.xml><?xml version="1.0" encoding="utf-8"?>
 <p:sld xmlns:a="http://schemas.openxmlformats.org/drawingml/2006/main" xmlns:r="http://schemas.openxmlformats.org/officeDocument/2006/relationships" xmlns:p="http://schemas.openxmlformats.org/presentationml/2006/main">
   <p:cSld>
     <p:spTree>
@@ -6636,7 +6893,7 @@
 </p:sld>
 </file>
 
-<file path=ppt/slides/slide7.xml><?xml version="1.0" encoding="utf-8"?>
+<file path=ppt/slides/slide8.xml><?xml version="1.0" encoding="utf-8"?>
 <p:sld xmlns:a="http://schemas.openxmlformats.org/drawingml/2006/main" xmlns:r="http://schemas.openxmlformats.org/officeDocument/2006/relationships" xmlns:p="http://schemas.openxmlformats.org/presentationml/2006/main">
   <p:cSld>
     <p:spTree>
@@ -6715,6 +6972,94 @@
     <p:extLst>
       <p:ext uri="{BB962C8B-B14F-4D97-AF65-F5344CB8AC3E}">
         <p14:creationId xmlns:p14="http://schemas.microsoft.com/office/powerpoint/2010/main" val="3473003492"/>
+      </p:ext>
+    </p:extLst>
+  </p:cSld>
+  <p:clrMapOvr>
+    <a:masterClrMapping/>
+  </p:clrMapOvr>
+</p:sld>
+</file>
+
+<file path=ppt/slides/slide9.xml><?xml version="1.0" encoding="utf-8"?>
+<p:sld xmlns:a="http://schemas.openxmlformats.org/drawingml/2006/main" xmlns:r="http://schemas.openxmlformats.org/officeDocument/2006/relationships" xmlns:p="http://schemas.openxmlformats.org/presentationml/2006/main">
+  <p:cSld>
+    <p:spTree>
+      <p:nvGrpSpPr>
+        <p:cNvPr id="1" name=""/>
+        <p:cNvGrpSpPr/>
+        <p:nvPr/>
+      </p:nvGrpSpPr>
+      <p:grpSpPr>
+        <a:xfrm>
+          <a:off x="0" y="0"/>
+          <a:ext cx="0" cy="0"/>
+          <a:chOff x="0" y="0"/>
+          <a:chExt cx="0" cy="0"/>
+        </a:xfrm>
+      </p:grpSpPr>
+      <p:sp>
+        <p:nvSpPr>
+          <p:cNvPr id="2" name="Заголовок 1">
+            <a:extLst>
+              <a:ext uri="{FF2B5EF4-FFF2-40B4-BE49-F238E27FC236}">
+                <a16:creationId xmlns:a16="http://schemas.microsoft.com/office/drawing/2014/main" id="{8FE98712-0F9E-47FC-B957-9FB0221F4F63}"/>
+              </a:ext>
+            </a:extLst>
+          </p:cNvPr>
+          <p:cNvSpPr>
+            <a:spLocks noGrp="1"/>
+          </p:cNvSpPr>
+          <p:nvPr>
+            <p:ph type="title"/>
+          </p:nvPr>
+        </p:nvSpPr>
+        <p:spPr/>
+        <p:txBody>
+          <a:bodyPr/>
+          <a:lstStyle/>
+          <a:p>
+            <a:r>
+              <a:rPr lang="en-US"/>
+              <a:t>Accuracy is 80%</a:t>
+            </a:r>
+            <a:endParaRPr lang="ru-RU" dirty="0"/>
+          </a:p>
+        </p:txBody>
+      </p:sp>
+      <p:pic>
+        <p:nvPicPr>
+          <p:cNvPr id="5" name="Объект 4">
+            <a:extLst>
+              <a:ext uri="{FF2B5EF4-FFF2-40B4-BE49-F238E27FC236}">
+                <a16:creationId xmlns:a16="http://schemas.microsoft.com/office/drawing/2014/main" id="{D04CA8CE-4BD2-47EF-99B3-93DF548B6DBA}"/>
+              </a:ext>
+            </a:extLst>
+          </p:cNvPr>
+          <p:cNvPicPr>
+            <a:picLocks noGrp="1" noChangeAspect="1"/>
+          </p:cNvPicPr>
+          <p:nvPr>
+            <p:ph idx="1"/>
+          </p:nvPr>
+        </p:nvPicPr>
+        <p:blipFill>
+          <a:blip r:embed="rId2"/>
+          <a:stretch>
+            <a:fillRect/>
+          </a:stretch>
+        </p:blipFill>
+        <p:spPr>
+          <a:xfrm>
+            <a:off x="1719743" y="2407057"/>
+            <a:ext cx="8113487" cy="5719691"/>
+          </a:xfrm>
+        </p:spPr>
+      </p:pic>
+    </p:spTree>
+    <p:extLst>
+      <p:ext uri="{BB962C8B-B14F-4D97-AF65-F5344CB8AC3E}">
+        <p14:creationId xmlns:p14="http://schemas.microsoft.com/office/powerpoint/2010/main" val="2601829435"/>
       </p:ext>
     </p:extLst>
   </p:cSld>

</xml_diff>